<commit_message>
sim images for slides
</commit_message>
<xml_diff>
--- a/weekly_updates/mres_project_update_22_03_2021.pptx
+++ b/weekly_updates/mres_project_update_22_03_2021.pptx
@@ -9,7 +9,8 @@
     <p:sldId id="257" r:id="rId3"/>
     <p:sldId id="259" r:id="rId4"/>
     <p:sldId id="258" r:id="rId5"/>
-    <p:sldId id="261" r:id="rId6"/>
+    <p:sldId id="262" r:id="rId6"/>
+    <p:sldId id="261" r:id="rId7"/>
   </p:sldIdLst>
   <p:sldSz cx="12192000" cy="6858000"/>
   <p:notesSz cx="6858000" cy="9144000"/>
@@ -108,6 +109,11 @@
       </a:defRPr>
     </a:lvl9pPr>
   </p:defaultTextStyle>
+  <p:extLst>
+    <p:ext uri="{EFAFB233-063F-42B5-8137-9DF3F51BA10A}">
+      <p15:sldGuideLst xmlns:p15="http://schemas.microsoft.com/office/powerpoint/2012/main"/>
+    </p:ext>
+  </p:extLst>
 </p:presentation>
 </file>
 
@@ -258,7 +264,7 @@
           <a:p>
             <a:fld id="{F522E458-2DE3-4186-88BC-14DDD60C3D1E}" type="datetimeFigureOut">
               <a:rPr lang="en-US" smtClean="0"/>
-              <a:t>21-Mar-21</a:t>
+              <a:t>23-Mar-21</a:t>
             </a:fld>
             <a:endParaRPr lang="en-US"/>
           </a:p>
@@ -456,7 +462,7 @@
           <a:p>
             <a:fld id="{F522E458-2DE3-4186-88BC-14DDD60C3D1E}" type="datetimeFigureOut">
               <a:rPr lang="en-US" smtClean="0"/>
-              <a:t>21-Mar-21</a:t>
+              <a:t>23-Mar-21</a:t>
             </a:fld>
             <a:endParaRPr lang="en-US"/>
           </a:p>
@@ -664,7 +670,7 @@
           <a:p>
             <a:fld id="{F522E458-2DE3-4186-88BC-14DDD60C3D1E}" type="datetimeFigureOut">
               <a:rPr lang="en-US" smtClean="0"/>
-              <a:t>21-Mar-21</a:t>
+              <a:t>23-Mar-21</a:t>
             </a:fld>
             <a:endParaRPr lang="en-US"/>
           </a:p>
@@ -862,7 +868,7 @@
           <a:p>
             <a:fld id="{F522E458-2DE3-4186-88BC-14DDD60C3D1E}" type="datetimeFigureOut">
               <a:rPr lang="en-US" smtClean="0"/>
-              <a:t>21-Mar-21</a:t>
+              <a:t>23-Mar-21</a:t>
             </a:fld>
             <a:endParaRPr lang="en-US"/>
           </a:p>
@@ -1137,7 +1143,7 @@
           <a:p>
             <a:fld id="{F522E458-2DE3-4186-88BC-14DDD60C3D1E}" type="datetimeFigureOut">
               <a:rPr lang="en-US" smtClean="0"/>
-              <a:t>21-Mar-21</a:t>
+              <a:t>23-Mar-21</a:t>
             </a:fld>
             <a:endParaRPr lang="en-US"/>
           </a:p>
@@ -1402,7 +1408,7 @@
           <a:p>
             <a:fld id="{F522E458-2DE3-4186-88BC-14DDD60C3D1E}" type="datetimeFigureOut">
               <a:rPr lang="en-US" smtClean="0"/>
-              <a:t>21-Mar-21</a:t>
+              <a:t>23-Mar-21</a:t>
             </a:fld>
             <a:endParaRPr lang="en-US"/>
           </a:p>
@@ -1814,7 +1820,7 @@
           <a:p>
             <a:fld id="{F522E458-2DE3-4186-88BC-14DDD60C3D1E}" type="datetimeFigureOut">
               <a:rPr lang="en-US" smtClean="0"/>
-              <a:t>21-Mar-21</a:t>
+              <a:t>23-Mar-21</a:t>
             </a:fld>
             <a:endParaRPr lang="en-US"/>
           </a:p>
@@ -1955,7 +1961,7 @@
           <a:p>
             <a:fld id="{F522E458-2DE3-4186-88BC-14DDD60C3D1E}" type="datetimeFigureOut">
               <a:rPr lang="en-US" smtClean="0"/>
-              <a:t>21-Mar-21</a:t>
+              <a:t>23-Mar-21</a:t>
             </a:fld>
             <a:endParaRPr lang="en-US"/>
           </a:p>
@@ -2068,7 +2074,7 @@
           <a:p>
             <a:fld id="{F522E458-2DE3-4186-88BC-14DDD60C3D1E}" type="datetimeFigureOut">
               <a:rPr lang="en-US" smtClean="0"/>
-              <a:t>21-Mar-21</a:t>
+              <a:t>23-Mar-21</a:t>
             </a:fld>
             <a:endParaRPr lang="en-US"/>
           </a:p>
@@ -2379,7 +2385,7 @@
           <a:p>
             <a:fld id="{F522E458-2DE3-4186-88BC-14DDD60C3D1E}" type="datetimeFigureOut">
               <a:rPr lang="en-US" smtClean="0"/>
-              <a:t>21-Mar-21</a:t>
+              <a:t>23-Mar-21</a:t>
             </a:fld>
             <a:endParaRPr lang="en-US"/>
           </a:p>
@@ -2667,7 +2673,7 @@
           <a:p>
             <a:fld id="{F522E458-2DE3-4186-88BC-14DDD60C3D1E}" type="datetimeFigureOut">
               <a:rPr lang="en-US" smtClean="0"/>
-              <a:t>21-Mar-21</a:t>
+              <a:t>23-Mar-21</a:t>
             </a:fld>
             <a:endParaRPr lang="en-US"/>
           </a:p>
@@ -2908,7 +2914,7 @@
           <a:p>
             <a:fld id="{F522E458-2DE3-4186-88BC-14DDD60C3D1E}" type="datetimeFigureOut">
               <a:rPr lang="en-US" smtClean="0"/>
-              <a:t>21-Mar-21</a:t>
+              <a:t>23-Mar-21</a:t>
             </a:fld>
             <a:endParaRPr lang="en-US"/>
           </a:p>
@@ -3493,7 +3499,7 @@
               <a:rPr lang="en-US" sz="3600" dirty="0">
                 <a:latin typeface="+mj-lt"/>
               </a:rPr>
-              <a:t>Complete online training courses</a:t>
+              <a:t>Completed online training courses</a:t>
             </a:r>
           </a:p>
           <a:p>
@@ -3505,7 +3511,7 @@
               <a:rPr lang="en-US" sz="3600" dirty="0">
                 <a:latin typeface="+mj-lt"/>
               </a:rPr>
-              <a:t>Produce EIT images of simple finger model</a:t>
+              <a:t>Produced EIT images of simple finger model</a:t>
             </a:r>
           </a:p>
         </p:txBody>
@@ -3542,7 +3548,7 @@
       </p:grpSpPr>
       <p:pic>
         <p:nvPicPr>
-          <p:cNvPr id="7" name="Picture 6" descr="Chart, scatter chart&#10;&#10;Description automatically generated">
+          <p:cNvPr id="7" name="Picture 6">
             <a:extLst>
               <a:ext uri="{FF2B5EF4-FFF2-40B4-BE49-F238E27FC236}">
                 <a16:creationId xmlns:a16="http://schemas.microsoft.com/office/drawing/2014/main" id="{5DC8E328-973E-4854-8C7D-B82E98C06C38}"/>
@@ -3562,14 +3568,13 @@
               </a:ext>
             </a:extLst>
           </a:blip>
-          <a:stretch>
-            <a:fillRect/>
-          </a:stretch>
+          <a:srcRect/>
+          <a:stretch/>
         </p:blipFill>
         <p:spPr>
           <a:xfrm>
-            <a:off x="4647927" y="1436723"/>
-            <a:ext cx="8866013" cy="4302788"/>
+            <a:off x="6507662" y="1599439"/>
+            <a:ext cx="5139841" cy="4140072"/>
           </a:xfrm>
           <a:prstGeom prst="rect">
             <a:avLst/>
@@ -3578,7 +3583,7 @@
       </p:pic>
       <p:pic>
         <p:nvPicPr>
-          <p:cNvPr id="9" name="Picture 8" descr="Chart, scatter chart&#10;&#10;Description automatically generated">
+          <p:cNvPr id="9" name="Picture 8">
             <a:extLst>
               <a:ext uri="{FF2B5EF4-FFF2-40B4-BE49-F238E27FC236}">
                 <a16:creationId xmlns:a16="http://schemas.microsoft.com/office/drawing/2014/main" id="{9C44544D-4365-471C-939D-19FD9D73B885}"/>
@@ -3598,13 +3603,13 @@
               </a:ext>
             </a:extLst>
           </a:blip>
-          <a:srcRect r="15602"/>
+          <a:srcRect l="7425" t="14306" r="7774" b="14306"/>
           <a:stretch/>
         </p:blipFill>
         <p:spPr>
           <a:xfrm>
-            <a:off x="-1562352" y="1436723"/>
-            <a:ext cx="7482739" cy="4302788"/>
+            <a:off x="102944" y="1788007"/>
+            <a:ext cx="5827339" cy="3951504"/>
           </a:xfrm>
           <a:prstGeom prst="rect">
             <a:avLst/>
@@ -3662,8 +3667,8 @@
         </p:nvSpPr>
         <p:spPr>
           <a:xfrm>
-            <a:off x="9150057" y="5940572"/>
-            <a:ext cx="3276096" cy="646331"/>
+            <a:off x="8993038" y="5744231"/>
+            <a:ext cx="2801798" cy="923330"/>
           </a:xfrm>
           <a:prstGeom prst="rect">
             <a:avLst/>
@@ -3681,6 +3686,14 @@
                 <a:latin typeface="+mj-lt"/>
               </a:rPr>
               <a:t>6 electrodes</a:t>
+            </a:r>
+          </a:p>
+          <a:p>
+            <a:r>
+              <a:rPr lang="en-US" dirty="0">
+                <a:latin typeface="+mj-lt"/>
+              </a:rPr>
+              <a:t>Actuator wall is 2 mm thick</a:t>
             </a:r>
           </a:p>
           <a:p>
@@ -3725,7 +3738,7 @@
       </p:grpSpPr>
       <p:pic>
         <p:nvPicPr>
-          <p:cNvPr id="27" name="Picture 26" descr="Chart&#10;&#10;Description automatically generated with medium confidence">
+          <p:cNvPr id="27" name="Picture 26">
             <a:extLst>
               <a:ext uri="{FF2B5EF4-FFF2-40B4-BE49-F238E27FC236}">
                 <a16:creationId xmlns:a16="http://schemas.microsoft.com/office/drawing/2014/main" id="{B8C6ACFD-3115-4674-AFB6-E02C249FE5EB}"/>
@@ -3737,7 +3750,7 @@
           </p:cNvPicPr>
           <p:nvPr/>
         </p:nvPicPr>
-        <p:blipFill>
+        <p:blipFill rotWithShape="1">
           <a:blip r:embed="rId2">
             <a:extLst>
               <a:ext uri="{28A0092B-C50C-407E-A947-70E740481C1C}">
@@ -3745,14 +3758,13 @@
               </a:ext>
             </a:extLst>
           </a:blip>
-          <a:stretch>
-            <a:fillRect/>
-          </a:stretch>
+          <a:srcRect l="12737" r="5251"/>
+          <a:stretch/>
         </p:blipFill>
         <p:spPr>
           <a:xfrm>
-            <a:off x="3802935" y="3476539"/>
-            <a:ext cx="4643912" cy="3207459"/>
+            <a:off x="3682313" y="3985100"/>
+            <a:ext cx="4827374" cy="2726985"/>
           </a:xfrm>
           <a:prstGeom prst="rect">
             <a:avLst/>
@@ -3761,7 +3773,7 @@
       </p:pic>
       <p:pic>
         <p:nvPicPr>
-          <p:cNvPr id="9" name="Picture 8" descr="Background pattern&#10;&#10;Description automatically generated">
+          <p:cNvPr id="9" name="Picture 8">
             <a:extLst>
               <a:ext uri="{FF2B5EF4-FFF2-40B4-BE49-F238E27FC236}">
                 <a16:creationId xmlns:a16="http://schemas.microsoft.com/office/drawing/2014/main" id="{82BA7E51-F705-4744-B8B5-6BCDE430F8D2}"/>
@@ -3773,7 +3785,7 @@
           </p:cNvPicPr>
           <p:nvPr/>
         </p:nvPicPr>
-        <p:blipFill>
+        <p:blipFill rotWithShape="1">
           <a:blip r:embed="rId3">
             <a:extLst>
               <a:ext uri="{28A0092B-C50C-407E-A947-70E740481C1C}">
@@ -3781,14 +3793,13 @@
               </a:ext>
             </a:extLst>
           </a:blip>
-          <a:stretch>
-            <a:fillRect/>
-          </a:stretch>
+          <a:srcRect l="10375" r="6269"/>
+          <a:stretch/>
         </p:blipFill>
         <p:spPr>
           <a:xfrm>
-            <a:off x="6777007" y="174002"/>
-            <a:ext cx="5016331" cy="3209602"/>
+            <a:off x="6864470" y="1010494"/>
+            <a:ext cx="4906505" cy="2726985"/>
           </a:xfrm>
           <a:prstGeom prst="rect">
             <a:avLst/>
@@ -3797,7 +3808,7 @@
       </p:pic>
       <p:pic>
         <p:nvPicPr>
-          <p:cNvPr id="11" name="Picture 10" descr="Graphical user interface, application&#10;&#10;Description automatically generated">
+          <p:cNvPr id="11" name="Picture 10">
             <a:extLst>
               <a:ext uri="{FF2B5EF4-FFF2-40B4-BE49-F238E27FC236}">
                 <a16:creationId xmlns:a16="http://schemas.microsoft.com/office/drawing/2014/main" id="{FF2FEF13-A929-4027-9A1C-DDCD546E55F5}"/>
@@ -3809,7 +3820,7 @@
           </p:cNvPicPr>
           <p:nvPr/>
         </p:nvPicPr>
-        <p:blipFill>
+        <p:blipFill rotWithShape="1">
           <a:blip r:embed="rId4">
             <a:extLst>
               <a:ext uri="{28A0092B-C50C-407E-A947-70E740481C1C}">
@@ -3817,14 +3828,13 @@
               </a:ext>
             </a:extLst>
           </a:blip>
-          <a:stretch>
-            <a:fillRect/>
-          </a:stretch>
+          <a:srcRect l="11153" r="6087" b="6132"/>
+          <a:stretch/>
         </p:blipFill>
         <p:spPr>
           <a:xfrm>
-            <a:off x="241217" y="174002"/>
-            <a:ext cx="5717521" cy="3209602"/>
+            <a:off x="421025" y="1010494"/>
+            <a:ext cx="5189663" cy="2726985"/>
           </a:xfrm>
           <a:prstGeom prst="rect">
             <a:avLst/>
@@ -3845,7 +3855,7 @@
         </p:nvSpPr>
         <p:spPr>
           <a:xfrm>
-            <a:off x="2349585" y="2609975"/>
+            <a:off x="2349585" y="2757702"/>
             <a:ext cx="1453350" cy="523220"/>
           </a:xfrm>
           <a:prstGeom prst="rect">
@@ -3885,7 +3895,7 @@
         </p:nvSpPr>
         <p:spPr>
           <a:xfrm>
-            <a:off x="8882978" y="2794641"/>
+            <a:off x="8882978" y="2919778"/>
             <a:ext cx="1453350" cy="523220"/>
           </a:xfrm>
           <a:prstGeom prst="rect">
@@ -3925,8 +3935,8 @@
         </p:nvSpPr>
         <p:spPr>
           <a:xfrm>
-            <a:off x="5771080" y="5947844"/>
-            <a:ext cx="1453350" cy="523220"/>
+            <a:off x="5365487" y="5961970"/>
+            <a:ext cx="1805677" cy="523220"/>
           </a:xfrm>
           <a:prstGeom prst="rect">
             <a:avLst/>
@@ -3966,7 +3976,7 @@
         <p:spPr>
           <a:xfrm>
             <a:off x="9609653" y="4484013"/>
-            <a:ext cx="2446474" cy="1323439"/>
+            <a:ext cx="2446474" cy="1015663"/>
           </a:xfrm>
           <a:prstGeom prst="rect">
             <a:avLst/>
@@ -4011,16 +4021,41 @@
               <a:t>Log scale</a:t>
             </a:r>
           </a:p>
-          <a:p>
-            <a:pPr marL="285750" indent="-285750">
-              <a:buFont typeface="Arial" panose="020B0604020202020204" pitchFamily="34" charset="0"/>
-              <a:buChar char="•"/>
-            </a:pPr>
-            <a:r>
-              <a:rPr lang="en-US" sz="2000" dirty="0">
+        </p:txBody>
+      </p:sp>
+      <p:sp>
+        <p:nvSpPr>
+          <p:cNvPr id="10" name="TextBox 9">
+            <a:extLst>
+              <a:ext uri="{FF2B5EF4-FFF2-40B4-BE49-F238E27FC236}">
+                <a16:creationId xmlns:a16="http://schemas.microsoft.com/office/drawing/2014/main" id="{B1AE895B-94AA-4B71-983D-65A4312B3E61}"/>
+              </a:ext>
+            </a:extLst>
+          </p:cNvPr>
+          <p:cNvSpPr txBox="1"/>
+          <p:nvPr/>
+        </p:nvSpPr>
+        <p:spPr>
+          <a:xfrm>
+            <a:off x="1895972" y="169470"/>
+            <a:ext cx="8400056" cy="584775"/>
+          </a:xfrm>
+          <a:prstGeom prst="rect">
+            <a:avLst/>
+          </a:prstGeom>
+          <a:noFill/>
+        </p:spPr>
+        <p:txBody>
+          <a:bodyPr wrap="none" rtlCol="0">
+            <a:spAutoFit/>
+          </a:bodyPr>
+          <a:lstStyle/>
+          <a:p>
+            <a:r>
+              <a:rPr lang="en-US" sz="3200" b="1" dirty="0">
                 <a:latin typeface="+mj-lt"/>
               </a:rPr>
-              <a:t>6 electrodes</a:t>
+              <a:t>EIDORS simulations of simple 2-joint actuator</a:t>
             </a:r>
           </a:p>
         </p:txBody>
@@ -4039,6 +4074,411 @@
 </file>
 
 <file path=ppt/slides/slide5.xml><?xml version="1.0" encoding="utf-8"?>
+<p:sld xmlns:a="http://schemas.openxmlformats.org/drawingml/2006/main" xmlns:r="http://schemas.openxmlformats.org/officeDocument/2006/relationships" xmlns:p="http://schemas.openxmlformats.org/presentationml/2006/main">
+  <p:cSld>
+    <p:spTree>
+      <p:nvGrpSpPr>
+        <p:cNvPr id="1" name=""/>
+        <p:cNvGrpSpPr/>
+        <p:nvPr/>
+      </p:nvGrpSpPr>
+      <p:grpSpPr>
+        <a:xfrm>
+          <a:off x="0" y="0"/>
+          <a:ext cx="0" cy="0"/>
+          <a:chOff x="0" y="0"/>
+          <a:chExt cx="0" cy="0"/>
+        </a:xfrm>
+      </p:grpSpPr>
+      <p:pic>
+        <p:nvPicPr>
+          <p:cNvPr id="5" name="Picture 4" descr="Chart&#10;&#10;Description automatically generated">
+            <a:extLst>
+              <a:ext uri="{FF2B5EF4-FFF2-40B4-BE49-F238E27FC236}">
+                <a16:creationId xmlns:a16="http://schemas.microsoft.com/office/drawing/2014/main" id="{62A25FB3-EF01-4505-A67B-3F43BAE8DD4C}"/>
+              </a:ext>
+            </a:extLst>
+          </p:cNvPr>
+          <p:cNvPicPr>
+            <a:picLocks noChangeAspect="1"/>
+          </p:cNvPicPr>
+          <p:nvPr/>
+        </p:nvPicPr>
+        <p:blipFill>
+          <a:blip r:embed="rId2">
+            <a:extLst>
+              <a:ext uri="{28A0092B-C50C-407E-A947-70E740481C1C}">
+                <a14:useLocalDpi xmlns:a14="http://schemas.microsoft.com/office/drawing/2010/main" val="0"/>
+              </a:ext>
+            </a:extLst>
+          </a:blip>
+          <a:stretch>
+            <a:fillRect/>
+          </a:stretch>
+        </p:blipFill>
+        <p:spPr>
+          <a:xfrm>
+            <a:off x="101206" y="665404"/>
+            <a:ext cx="4213341" cy="3160006"/>
+          </a:xfrm>
+          <a:prstGeom prst="rect">
+            <a:avLst/>
+          </a:prstGeom>
+        </p:spPr>
+      </p:pic>
+      <p:sp>
+        <p:nvSpPr>
+          <p:cNvPr id="10" name="TextBox 9">
+            <a:extLst>
+              <a:ext uri="{FF2B5EF4-FFF2-40B4-BE49-F238E27FC236}">
+                <a16:creationId xmlns:a16="http://schemas.microsoft.com/office/drawing/2014/main" id="{EE13B647-3053-45F4-A35F-D94E00A510D7}"/>
+              </a:ext>
+            </a:extLst>
+          </p:cNvPr>
+          <p:cNvSpPr txBox="1"/>
+          <p:nvPr/>
+        </p:nvSpPr>
+        <p:spPr>
+          <a:xfrm>
+            <a:off x="2633994" y="80629"/>
+            <a:ext cx="6924011" cy="584775"/>
+          </a:xfrm>
+          <a:prstGeom prst="rect">
+            <a:avLst/>
+          </a:prstGeom>
+          <a:noFill/>
+        </p:spPr>
+        <p:txBody>
+          <a:bodyPr wrap="none" rtlCol="0">
+            <a:spAutoFit/>
+          </a:bodyPr>
+          <a:lstStyle/>
+          <a:p>
+            <a:r>
+              <a:rPr lang="en-US" sz="3200" b="1" dirty="0">
+                <a:latin typeface="+mj-lt"/>
+              </a:rPr>
+              <a:t>Voltages for each finger configuration:</a:t>
+            </a:r>
+          </a:p>
+        </p:txBody>
+      </p:sp>
+      <p:pic>
+        <p:nvPicPr>
+          <p:cNvPr id="3" name="Picture 2" descr="Chart&#10;&#10;Description automatically generated">
+            <a:extLst>
+              <a:ext uri="{FF2B5EF4-FFF2-40B4-BE49-F238E27FC236}">
+                <a16:creationId xmlns:a16="http://schemas.microsoft.com/office/drawing/2014/main" id="{9D9FD7FB-D05F-4204-9168-A9997D50E4E1}"/>
+              </a:ext>
+            </a:extLst>
+          </p:cNvPr>
+          <p:cNvPicPr>
+            <a:picLocks noChangeAspect="1"/>
+          </p:cNvPicPr>
+          <p:nvPr/>
+        </p:nvPicPr>
+        <p:blipFill rotWithShape="1">
+          <a:blip r:embed="rId3">
+            <a:extLst>
+              <a:ext uri="{28A0092B-C50C-407E-A947-70E740481C1C}">
+                <a14:useLocalDpi xmlns:a14="http://schemas.microsoft.com/office/drawing/2010/main" val="0"/>
+              </a:ext>
+            </a:extLst>
+          </a:blip>
+          <a:srcRect l="6033" r="6103"/>
+          <a:stretch/>
+        </p:blipFill>
+        <p:spPr>
+          <a:xfrm>
+            <a:off x="4142320" y="633748"/>
+            <a:ext cx="3701989" cy="3160006"/>
+          </a:xfrm>
+          <a:prstGeom prst="rect">
+            <a:avLst/>
+          </a:prstGeom>
+        </p:spPr>
+      </p:pic>
+      <p:pic>
+        <p:nvPicPr>
+          <p:cNvPr id="7" name="Picture 6" descr="Chart&#10;&#10;Description automatically generated">
+            <a:extLst>
+              <a:ext uri="{FF2B5EF4-FFF2-40B4-BE49-F238E27FC236}">
+                <a16:creationId xmlns:a16="http://schemas.microsoft.com/office/drawing/2014/main" id="{3DDF79B4-75DC-4B8C-BAB3-54353B76F838}"/>
+              </a:ext>
+            </a:extLst>
+          </p:cNvPr>
+          <p:cNvPicPr>
+            <a:picLocks noChangeAspect="1"/>
+          </p:cNvPicPr>
+          <p:nvPr/>
+        </p:nvPicPr>
+        <p:blipFill rotWithShape="1">
+          <a:blip r:embed="rId4">
+            <a:extLst>
+              <a:ext uri="{28A0092B-C50C-407E-A947-70E740481C1C}">
+                <a14:useLocalDpi xmlns:a14="http://schemas.microsoft.com/office/drawing/2010/main" val="0"/>
+              </a:ext>
+            </a:extLst>
+          </a:blip>
+          <a:srcRect l="5829" r="6307"/>
+          <a:stretch/>
+        </p:blipFill>
+        <p:spPr>
+          <a:xfrm>
+            <a:off x="8096436" y="665405"/>
+            <a:ext cx="3701989" cy="3160005"/>
+          </a:xfrm>
+          <a:prstGeom prst="rect">
+            <a:avLst/>
+          </a:prstGeom>
+        </p:spPr>
+      </p:pic>
+      <p:pic>
+        <p:nvPicPr>
+          <p:cNvPr id="9" name="Picture 8" descr="A picture containing line chart&#10;&#10;Description automatically generated">
+            <a:extLst>
+              <a:ext uri="{FF2B5EF4-FFF2-40B4-BE49-F238E27FC236}">
+                <a16:creationId xmlns:a16="http://schemas.microsoft.com/office/drawing/2014/main" id="{5F06E0B4-F97E-4E59-847F-742E7F396246}"/>
+              </a:ext>
+            </a:extLst>
+          </p:cNvPr>
+          <p:cNvPicPr>
+            <a:picLocks noChangeAspect="1"/>
+          </p:cNvPicPr>
+          <p:nvPr/>
+        </p:nvPicPr>
+        <p:blipFill rotWithShape="1">
+          <a:blip r:embed="rId5">
+            <a:extLst>
+              <a:ext uri="{28A0092B-C50C-407E-A947-70E740481C1C}">
+                <a14:useLocalDpi xmlns:a14="http://schemas.microsoft.com/office/drawing/2010/main" val="0"/>
+              </a:ext>
+            </a:extLst>
+          </a:blip>
+          <a:srcRect l="7804" r="6791" b="5548"/>
+          <a:stretch/>
+        </p:blipFill>
+        <p:spPr>
+          <a:xfrm>
+            <a:off x="191757" y="3720433"/>
+            <a:ext cx="4213341" cy="3137567"/>
+          </a:xfrm>
+          <a:prstGeom prst="rect">
+            <a:avLst/>
+          </a:prstGeom>
+        </p:spPr>
+      </p:pic>
+      <p:sp>
+        <p:nvSpPr>
+          <p:cNvPr id="13" name="TextBox 12">
+            <a:extLst>
+              <a:ext uri="{FF2B5EF4-FFF2-40B4-BE49-F238E27FC236}">
+                <a16:creationId xmlns:a16="http://schemas.microsoft.com/office/drawing/2014/main" id="{55740D0A-EE9D-49D1-BEF7-D6100D824DB7}"/>
+              </a:ext>
+            </a:extLst>
+          </p:cNvPr>
+          <p:cNvSpPr txBox="1"/>
+          <p:nvPr/>
+        </p:nvSpPr>
+        <p:spPr>
+          <a:xfrm>
+            <a:off x="9355717" y="4179455"/>
+            <a:ext cx="2343746" cy="369332"/>
+          </a:xfrm>
+          <a:prstGeom prst="rect">
+            <a:avLst/>
+          </a:prstGeom>
+          <a:noFill/>
+        </p:spPr>
+        <p:txBody>
+          <a:bodyPr wrap="square" rtlCol="0">
+            <a:spAutoFit/>
+          </a:bodyPr>
+          <a:lstStyle/>
+          <a:p>
+            <a:pPr marL="285750" indent="-285750">
+              <a:buFont typeface="Arial" panose="020B0604020202020204" pitchFamily="34" charset="0"/>
+              <a:buChar char="•"/>
+            </a:pPr>
+            <a:r>
+              <a:rPr lang="en-US" dirty="0">
+                <a:latin typeface="+mj-lt"/>
+              </a:rPr>
+              <a:t>Very slight changes</a:t>
+            </a:r>
+          </a:p>
+        </p:txBody>
+      </p:sp>
+      <p:pic>
+        <p:nvPicPr>
+          <p:cNvPr id="15" name="Picture 14" descr="Chart&#10;&#10;Description automatically generated with medium confidence">
+            <a:extLst>
+              <a:ext uri="{FF2B5EF4-FFF2-40B4-BE49-F238E27FC236}">
+                <a16:creationId xmlns:a16="http://schemas.microsoft.com/office/drawing/2014/main" id="{CDF5EF9F-1007-4116-91E3-B27E4FD0DD92}"/>
+              </a:ext>
+            </a:extLst>
+          </p:cNvPr>
+          <p:cNvPicPr>
+            <a:picLocks noChangeAspect="1"/>
+          </p:cNvPicPr>
+          <p:nvPr/>
+        </p:nvPicPr>
+        <p:blipFill rotWithShape="1">
+          <a:blip r:embed="rId6">
+            <a:extLst>
+              <a:ext uri="{28A0092B-C50C-407E-A947-70E740481C1C}">
+                <a14:useLocalDpi xmlns:a14="http://schemas.microsoft.com/office/drawing/2010/main" val="0"/>
+              </a:ext>
+            </a:extLst>
+          </a:blip>
+          <a:srcRect l="9428" r="7808"/>
+          <a:stretch/>
+        </p:blipFill>
+        <p:spPr>
+          <a:xfrm>
+            <a:off x="4495649" y="3720433"/>
+            <a:ext cx="4761106" cy="3058414"/>
+          </a:xfrm>
+          <a:prstGeom prst="rect">
+            <a:avLst/>
+          </a:prstGeom>
+        </p:spPr>
+      </p:pic>
+    </p:spTree>
+    <p:extLst>
+      <p:ext uri="{BB962C8B-B14F-4D97-AF65-F5344CB8AC3E}">
+        <p14:creationId xmlns:p14="http://schemas.microsoft.com/office/powerpoint/2010/main" val="511983224"/>
+      </p:ext>
+    </p:extLst>
+  </p:cSld>
+  <p:clrMapOvr>
+    <a:masterClrMapping/>
+  </p:clrMapOvr>
+  <p:timing>
+    <p:tnLst>
+      <p:par>
+        <p:cTn id="1" dur="indefinite" restart="never" nodeType="tmRoot">
+          <p:childTnLst>
+            <p:seq concurrent="1" nextAc="seek">
+              <p:cTn id="2" dur="indefinite" nodeType="mainSeq">
+                <p:childTnLst>
+                  <p:par>
+                    <p:cTn id="3" fill="hold">
+                      <p:stCondLst>
+                        <p:cond delay="indefinite"/>
+                      </p:stCondLst>
+                      <p:childTnLst>
+                        <p:par>
+                          <p:cTn id="4" fill="hold">
+                            <p:stCondLst>
+                              <p:cond delay="0"/>
+                            </p:stCondLst>
+                            <p:childTnLst>
+                              <p:par>
+                                <p:cTn id="5" presetID="2" presetClass="entr" presetSubtype="4" fill="hold" nodeType="clickEffect">
+                                  <p:stCondLst>
+                                    <p:cond delay="0"/>
+                                  </p:stCondLst>
+                                  <p:childTnLst>
+                                    <p:set>
+                                      <p:cBhvr>
+                                        <p:cTn id="6" dur="1" fill="hold">
+                                          <p:stCondLst>
+                                            <p:cond delay="0"/>
+                                          </p:stCondLst>
+                                        </p:cTn>
+                                        <p:tgtEl>
+                                          <p:spTgt spid="15"/>
+                                        </p:tgtEl>
+                                        <p:attrNameLst>
+                                          <p:attrName>style.visibility</p:attrName>
+                                        </p:attrNameLst>
+                                      </p:cBhvr>
+                                      <p:to>
+                                        <p:strVal val="visible"/>
+                                      </p:to>
+                                    </p:set>
+                                    <p:anim calcmode="lin" valueType="num">
+                                      <p:cBhvr additive="base">
+                                        <p:cTn id="7" dur="500" fill="hold"/>
+                                        <p:tgtEl>
+                                          <p:spTgt spid="15"/>
+                                        </p:tgtEl>
+                                        <p:attrNameLst>
+                                          <p:attrName>ppt_x</p:attrName>
+                                        </p:attrNameLst>
+                                      </p:cBhvr>
+                                      <p:tavLst>
+                                        <p:tav tm="0">
+                                          <p:val>
+                                            <p:strVal val="#ppt_x"/>
+                                          </p:val>
+                                        </p:tav>
+                                        <p:tav tm="100000">
+                                          <p:val>
+                                            <p:strVal val="#ppt_x"/>
+                                          </p:val>
+                                        </p:tav>
+                                      </p:tavLst>
+                                    </p:anim>
+                                    <p:anim calcmode="lin" valueType="num">
+                                      <p:cBhvr additive="base">
+                                        <p:cTn id="8" dur="500" fill="hold"/>
+                                        <p:tgtEl>
+                                          <p:spTgt spid="15"/>
+                                        </p:tgtEl>
+                                        <p:attrNameLst>
+                                          <p:attrName>ppt_y</p:attrName>
+                                        </p:attrNameLst>
+                                      </p:cBhvr>
+                                      <p:tavLst>
+                                        <p:tav tm="0">
+                                          <p:val>
+                                            <p:strVal val="1+#ppt_h/2"/>
+                                          </p:val>
+                                        </p:tav>
+                                        <p:tav tm="100000">
+                                          <p:val>
+                                            <p:strVal val="#ppt_y"/>
+                                          </p:val>
+                                        </p:tav>
+                                      </p:tavLst>
+                                    </p:anim>
+                                  </p:childTnLst>
+                                </p:cTn>
+                              </p:par>
+                            </p:childTnLst>
+                          </p:cTn>
+                        </p:par>
+                      </p:childTnLst>
+                    </p:cTn>
+                  </p:par>
+                </p:childTnLst>
+              </p:cTn>
+              <p:prevCondLst>
+                <p:cond evt="onPrev" delay="0">
+                  <p:tgtEl>
+                    <p:sldTgt/>
+                  </p:tgtEl>
+                </p:cond>
+              </p:prevCondLst>
+              <p:nextCondLst>
+                <p:cond evt="onNext" delay="0">
+                  <p:tgtEl>
+                    <p:sldTgt/>
+                  </p:tgtEl>
+                </p:cond>
+              </p:nextCondLst>
+            </p:seq>
+          </p:childTnLst>
+        </p:cTn>
+      </p:par>
+    </p:tnLst>
+  </p:timing>
+</p:sld>
+</file>
+
+<file path=ppt/slides/slide6.xml><?xml version="1.0" encoding="utf-8"?>
 <p:sld xmlns:a="http://schemas.openxmlformats.org/drawingml/2006/main" xmlns:r="http://schemas.openxmlformats.org/officeDocument/2006/relationships" xmlns:p="http://schemas.openxmlformats.org/presentationml/2006/main">
   <p:cSld>
     <p:spTree>

</xml_diff>